<commit_message>
Modelo de Domínio Adicionado
</commit_message>
<xml_diff>
--- a/Fase1/Relatorio/Apresentação LI4.pptx
+++ b/Fase1/Relatorio/Apresentação LI4.pptx
@@ -264,7 +264,7 @@
           <a:p>
             <a:fld id="{54ADCF2C-A776-9840-9457-C95B203DA417}" type="datetimeFigureOut">
               <a:rPr lang="pt-PT" smtClean="0"/>
-              <a:t>04/03/18</a:t>
+              <a:t>13/03/18</a:t>
             </a:fld>
             <a:endParaRPr lang="pt-PT"/>
           </a:p>
@@ -475,7 +475,7 @@
           <a:p>
             <a:fld id="{54ADCF2C-A776-9840-9457-C95B203DA417}" type="datetimeFigureOut">
               <a:rPr lang="pt-PT" smtClean="0"/>
-              <a:t>04/03/18</a:t>
+              <a:t>13/03/18</a:t>
             </a:fld>
             <a:endParaRPr lang="pt-PT"/>
           </a:p>
@@ -690,7 +690,7 @@
           <a:p>
             <a:fld id="{54ADCF2C-A776-9840-9457-C95B203DA417}" type="datetimeFigureOut">
               <a:rPr lang="pt-PT" smtClean="0"/>
-              <a:t>04/03/18</a:t>
+              <a:t>13/03/18</a:t>
             </a:fld>
             <a:endParaRPr lang="pt-PT"/>
           </a:p>
@@ -891,7 +891,7 @@
           <a:p>
             <a:fld id="{54ADCF2C-A776-9840-9457-C95B203DA417}" type="datetimeFigureOut">
               <a:rPr lang="pt-PT" smtClean="0"/>
-              <a:t>04/03/18</a:t>
+              <a:t>13/03/18</a:t>
             </a:fld>
             <a:endParaRPr lang="pt-PT"/>
           </a:p>
@@ -1170,7 +1170,7 @@
           <a:p>
             <a:fld id="{54ADCF2C-A776-9840-9457-C95B203DA417}" type="datetimeFigureOut">
               <a:rPr lang="pt-PT" smtClean="0"/>
-              <a:t>04/03/18</a:t>
+              <a:t>13/03/18</a:t>
             </a:fld>
             <a:endParaRPr lang="pt-PT"/>
           </a:p>
@@ -1438,7 +1438,7 @@
           <a:p>
             <a:fld id="{54ADCF2C-A776-9840-9457-C95B203DA417}" type="datetimeFigureOut">
               <a:rPr lang="pt-PT" smtClean="0"/>
-              <a:t>04/03/18</a:t>
+              <a:t>13/03/18</a:t>
             </a:fld>
             <a:endParaRPr lang="pt-PT"/>
           </a:p>
@@ -1854,7 +1854,7 @@
           <a:p>
             <a:fld id="{54ADCF2C-A776-9840-9457-C95B203DA417}" type="datetimeFigureOut">
               <a:rPr lang="pt-PT" smtClean="0"/>
-              <a:t>04/03/18</a:t>
+              <a:t>13/03/18</a:t>
             </a:fld>
             <a:endParaRPr lang="pt-PT"/>
           </a:p>
@@ -2003,7 +2003,7 @@
           <a:p>
             <a:fld id="{54ADCF2C-A776-9840-9457-C95B203DA417}" type="datetimeFigureOut">
               <a:rPr lang="pt-PT" smtClean="0"/>
-              <a:t>04/03/18</a:t>
+              <a:t>13/03/18</a:t>
             </a:fld>
             <a:endParaRPr lang="pt-PT"/>
           </a:p>
@@ -2129,7 +2129,7 @@
           <a:p>
             <a:fld id="{54ADCF2C-A776-9840-9457-C95B203DA417}" type="datetimeFigureOut">
               <a:rPr lang="pt-PT" smtClean="0"/>
-              <a:t>04/03/18</a:t>
+              <a:t>13/03/18</a:t>
             </a:fld>
             <a:endParaRPr lang="pt-PT"/>
           </a:p>
@@ -2380,7 +2380,7 @@
           <a:p>
             <a:fld id="{54ADCF2C-A776-9840-9457-C95B203DA417}" type="datetimeFigureOut">
               <a:rPr lang="pt-PT" smtClean="0"/>
-              <a:t>04/03/18</a:t>
+              <a:t>13/03/18</a:t>
             </a:fld>
             <a:endParaRPr lang="pt-PT"/>
           </a:p>
@@ -2825,7 +2825,7 @@
           <a:p>
             <a:fld id="{54ADCF2C-A776-9840-9457-C95B203DA417}" type="datetimeFigureOut">
               <a:rPr lang="pt-PT" smtClean="0"/>
-              <a:t>04/03/18</a:t>
+              <a:t>13/03/18</a:t>
             </a:fld>
             <a:endParaRPr lang="pt-PT"/>
           </a:p>
@@ -3151,7 +3151,7 @@
           <a:p>
             <a:fld id="{54ADCF2C-A776-9840-9457-C95B203DA417}" type="datetimeFigureOut">
               <a:rPr lang="pt-PT" smtClean="0"/>
-              <a:t>04/03/18</a:t>
+              <a:t>13/03/18</a:t>
             </a:fld>
             <a:endParaRPr lang="pt-PT"/>
           </a:p>
@@ -5843,12 +5843,24 @@
               <a:t> A </a:t>
             </a:r>
             <a:r>
+              <a:rPr lang="pt-PT" i="1" dirty="0" err="1"/>
+              <a:t>Smart</a:t>
+            </a:r>
+            <a:r>
               <a:rPr lang="pt-PT" i="1" dirty="0"/>
-              <a:t>Sweet Home Painting</a:t>
-            </a:r>
-            <a:r>
-              <a:rPr lang="pt-PT" dirty="0"/>
-              <a:t> é uma aplicação que o vai ajudar quando precisar de dar outra alegria e cor ao seu lar; apenas precisa de ter o seu smartphone à mão e no momento a seguir poderá ter em sua casa um pintor certificado e preparado com as suas escolhas, de forma a dar a vivacidade e a mudança que pretende. No final, pode avaliar os nossos serviços e inclusive recomendar aos seus amigos através das suas redes sociais e efetuar o pagamento sem chatices, pois pode associar o seu cartão de crédito ao seu perfil de cliente. Não volte a aventurar-se no incerto e descarregue já a nossa aplicação.</a:t>
+              <a:t> </a:t>
+            </a:r>
+            <a:r>
+              <a:rPr lang="pt-PT" i="1"/>
+              <a:t>PAinting</a:t>
+            </a:r>
+            <a:r>
+              <a:rPr lang="pt-PT"/>
+              <a:t>é</a:t>
+            </a:r>
+            <a:r>
+              <a:rPr lang="pt-PT" dirty="0"/>
+              <a:t> uma aplicação que o vai ajudar quando precisar de dar outra alegria e cor ao seu lar; apenas precisa de ter o seu smartphone à mão e no momento a seguir poderá ter em sua casa um pintor certificado e preparado com as suas escolhas, de forma a dar a vivacidade e a mudança que pretende. No final, pode avaliar os nossos serviços e inclusive recomendar aos seus amigos através das suas redes sociais e efetuar o pagamento sem chatices, pois pode associar o seu cartão de crédito ao seu perfil de cliente. Não volte a aventurar-se no incerto e descarregue já a nossa aplicação.</a:t>
             </a:r>
           </a:p>
           <a:p>

</xml_diff>